<commit_message>
Regenerate decks with 'Methodology & Sources' final slide
</commit_message>
<xml_diff>
--- a/output/pitch_comps_v2.pptx
+++ b/output/pitch_comps_v2.pptx
@@ -3110,7 +3110,7 @@
           <a:lstStyle/>
           <a:p>
             <a:r>
-              <a:t>Tech Comps – Oct 2025</a:t>
+              <a:t>US Software Comps – Oct 2025</a:t>
             </a:r>
           </a:p>
         </p:txBody>
@@ -5232,7 +5232,7 @@
           <a:lstStyle/>
           <a:p>
             <a:r>
-              <a:t>Next steps (for a live case)</a:t>
+              <a:t>Methodology &amp; Sources</a:t>
             </a:r>
           </a:p>
         </p:txBody>
@@ -5254,19 +5254,19 @@
           <a:p>
             <a:pPr/>
             <a:r>
-              <a:t>Replace sample numbers with live data (Bloomberg/FactSet or yfinance)</a:t>
+              <a:t>Universe: 10 listed software comps; currency: USD; base: TTM.</a:t>
             </a:r>
           </a:p>
           <a:p>
             <a:pPr/>
             <a:r>
-              <a:t>Expand to 20–30 comps &amp; add sector filters</a:t>
+              <a:t>Valuation: EV/EBITDA &amp; P/E; medians and interquartile range (25–75th).</a:t>
             </a:r>
           </a:p>
           <a:p>
             <a:pPr/>
             <a:r>
-              <a:t>Add football field and Excel export</a:t>
+              <a:t>Outliers reviewed; results illustrative. Sources: public filings &amp; aggregators.</a:t>
             </a:r>
           </a:p>
         </p:txBody>

</xml_diff>